<commit_message>
fix speech & v3
</commit_message>
<xml_diff>
--- a/Дипломная работа/Консультации Хоменко/Презентация v2.0.pptx
+++ b/Дипломная работа/Консультации Хоменко/Презентация v2.0.pptx
@@ -15759,13 +15759,10 @@
           <a:lstStyle/>
           <a:p>
             <a:pPr algn="ctr"/>
-            <a:r>
-              <a:rPr lang="ru-RU" dirty="0">
-                <a:latin typeface="Times New Roman" panose="02020603050405020304" pitchFamily="18" charset="0"/>
-                <a:cs typeface="Times New Roman" panose="02020603050405020304" pitchFamily="18" charset="0"/>
-              </a:rPr>
-              <a:t>ДИАГРАММА «КАК БУДЕТ»</a:t>
-            </a:r>
+            <a:endParaRPr lang="ru-RU" dirty="0">
+              <a:latin typeface="Times New Roman" panose="02020603050405020304" pitchFamily="18" charset="0"/>
+              <a:cs typeface="Times New Roman" panose="02020603050405020304" pitchFamily="18" charset="0"/>
+            </a:endParaRPr>
           </a:p>
         </p:txBody>
       </p:sp>

</xml_diff>